<commit_message>
actually pretty much done, need to think a bit more about other areas
</commit_message>
<xml_diff>
--- a/ANAs.pptx
+++ b/ANAs.pptx
@@ -202,7 +202,7 @@
           <a:p>
             <a:fld id="{E33244F7-6EDC-4098-A2FC-DE5C43C385B3}" type="datetimeFigureOut">
               <a:rPr lang="en-US" smtClean="0"/>
-              <a:t>1/18/2022</a:t>
+              <a:t>1/19/2022</a:t>
             </a:fld>
             <a:endParaRPr lang="en-US"/>
           </a:p>
@@ -952,7 +952,7 @@
           <a:p>
             <a:fld id="{F978D6D9-2A7C-491E-92E0-6BCF88E01484}" type="datetimeFigureOut">
               <a:rPr lang="fr-FR" smtClean="0"/>
-              <a:t>18/01/2022</a:t>
+              <a:t>19/01/2022</a:t>
             </a:fld>
             <a:endParaRPr lang="fr-FR"/>
           </a:p>
@@ -1150,7 +1150,7 @@
           <a:p>
             <a:fld id="{F978D6D9-2A7C-491E-92E0-6BCF88E01484}" type="datetimeFigureOut">
               <a:rPr lang="fr-FR" smtClean="0"/>
-              <a:t>18/01/2022</a:t>
+              <a:t>19/01/2022</a:t>
             </a:fld>
             <a:endParaRPr lang="fr-FR"/>
           </a:p>
@@ -1358,7 +1358,7 @@
           <a:p>
             <a:fld id="{F978D6D9-2A7C-491E-92E0-6BCF88E01484}" type="datetimeFigureOut">
               <a:rPr lang="fr-FR" smtClean="0"/>
-              <a:t>18/01/2022</a:t>
+              <a:t>19/01/2022</a:t>
             </a:fld>
             <a:endParaRPr lang="fr-FR"/>
           </a:p>
@@ -1556,7 +1556,7 @@
           <a:p>
             <a:fld id="{F978D6D9-2A7C-491E-92E0-6BCF88E01484}" type="datetimeFigureOut">
               <a:rPr lang="fr-FR" smtClean="0"/>
-              <a:t>18/01/2022</a:t>
+              <a:t>19/01/2022</a:t>
             </a:fld>
             <a:endParaRPr lang="fr-FR"/>
           </a:p>
@@ -1831,7 +1831,7 @@
           <a:p>
             <a:fld id="{F978D6D9-2A7C-491E-92E0-6BCF88E01484}" type="datetimeFigureOut">
               <a:rPr lang="fr-FR" smtClean="0"/>
-              <a:t>18/01/2022</a:t>
+              <a:t>19/01/2022</a:t>
             </a:fld>
             <a:endParaRPr lang="fr-FR"/>
           </a:p>
@@ -2096,7 +2096,7 @@
           <a:p>
             <a:fld id="{F978D6D9-2A7C-491E-92E0-6BCF88E01484}" type="datetimeFigureOut">
               <a:rPr lang="fr-FR" smtClean="0"/>
-              <a:t>18/01/2022</a:t>
+              <a:t>19/01/2022</a:t>
             </a:fld>
             <a:endParaRPr lang="fr-FR"/>
           </a:p>
@@ -2508,7 +2508,7 @@
           <a:p>
             <a:fld id="{F978D6D9-2A7C-491E-92E0-6BCF88E01484}" type="datetimeFigureOut">
               <a:rPr lang="fr-FR" smtClean="0"/>
-              <a:t>18/01/2022</a:t>
+              <a:t>19/01/2022</a:t>
             </a:fld>
             <a:endParaRPr lang="fr-FR"/>
           </a:p>
@@ -2649,7 +2649,7 @@
           <a:p>
             <a:fld id="{F978D6D9-2A7C-491E-92E0-6BCF88E01484}" type="datetimeFigureOut">
               <a:rPr lang="fr-FR" smtClean="0"/>
-              <a:t>18/01/2022</a:t>
+              <a:t>19/01/2022</a:t>
             </a:fld>
             <a:endParaRPr lang="fr-FR"/>
           </a:p>
@@ -2762,7 +2762,7 @@
           <a:p>
             <a:fld id="{F978D6D9-2A7C-491E-92E0-6BCF88E01484}" type="datetimeFigureOut">
               <a:rPr lang="fr-FR" smtClean="0"/>
-              <a:t>18/01/2022</a:t>
+              <a:t>19/01/2022</a:t>
             </a:fld>
             <a:endParaRPr lang="fr-FR"/>
           </a:p>
@@ -3073,7 +3073,7 @@
           <a:p>
             <a:fld id="{F978D6D9-2A7C-491E-92E0-6BCF88E01484}" type="datetimeFigureOut">
               <a:rPr lang="fr-FR" smtClean="0"/>
-              <a:t>18/01/2022</a:t>
+              <a:t>19/01/2022</a:t>
             </a:fld>
             <a:endParaRPr lang="fr-FR"/>
           </a:p>
@@ -3361,7 +3361,7 @@
           <a:p>
             <a:fld id="{F978D6D9-2A7C-491E-92E0-6BCF88E01484}" type="datetimeFigureOut">
               <a:rPr lang="fr-FR" smtClean="0"/>
-              <a:t>18/01/2022</a:t>
+              <a:t>19/01/2022</a:t>
             </a:fld>
             <a:endParaRPr lang="fr-FR"/>
           </a:p>
@@ -3602,7 +3602,7 @@
           <a:p>
             <a:fld id="{F978D6D9-2A7C-491E-92E0-6BCF88E01484}" type="datetimeFigureOut">
               <a:rPr lang="fr-FR" smtClean="0"/>
-              <a:t>18/01/2022</a:t>
+              <a:t>19/01/2022</a:t>
             </a:fld>
             <a:endParaRPr lang="fr-FR"/>
           </a:p>
@@ -5813,75 +5813,75 @@
               <a:t> = </a:t>
             </a:r>
             <a:r>
-              <a:rPr lang="de-DE" sz="1200" dirty="0" err="1"/>
+              <a:rPr lang="de-DE" sz="1200" b="1" dirty="0" err="1"/>
               <a:t>cue</a:t>
             </a:r>
             <a:r>
-              <a:rPr lang="de-DE" sz="1200" dirty="0"/>
+              <a:rPr lang="de-DE" sz="1200" b="1" dirty="0"/>
               <a:t> type (A, B, C, D), </a:t>
             </a:r>
             <a:r>
-              <a:rPr lang="de-DE" sz="1200" dirty="0" err="1"/>
+              <a:rPr lang="de-DE" sz="1200" b="1" dirty="0" err="1"/>
               <a:t>created</a:t>
             </a:r>
             <a:r>
-              <a:rPr lang="de-DE" sz="1200" dirty="0"/>
-              <a:t> </a:t>
-            </a:r>
-            <a:r>
-              <a:rPr lang="de-DE" sz="1200" dirty="0" err="1"/>
+              <a:rPr lang="de-DE" sz="1200" b="1" dirty="0"/>
+              <a:t> </a:t>
+            </a:r>
+            <a:r>
+              <a:rPr lang="de-DE" sz="1200" b="1" dirty="0" err="1"/>
               <a:t>byconvolving</a:t>
             </a:r>
             <a:r>
-              <a:rPr lang="de-DE" sz="1200" dirty="0"/>
-              <a:t> </a:t>
-            </a:r>
-            <a:r>
-              <a:rPr lang="de-DE" sz="1200" dirty="0" err="1"/>
+              <a:rPr lang="de-DE" sz="1200" b="1" dirty="0"/>
+              <a:t> </a:t>
+            </a:r>
+            <a:r>
+              <a:rPr lang="de-DE" sz="1200" b="1" dirty="0" err="1"/>
               <a:t>onset</a:t>
             </a:r>
             <a:r>
-              <a:rPr lang="de-DE" sz="1200" dirty="0"/>
+              <a:rPr lang="de-DE" sz="1200" b="1" dirty="0"/>
               <a:t> and </a:t>
             </a:r>
             <a:r>
-              <a:rPr lang="de-DE" sz="1200" dirty="0" err="1"/>
+              <a:rPr lang="de-DE" sz="1200" b="1" dirty="0" err="1"/>
               <a:t>duration</a:t>
             </a:r>
             <a:r>
-              <a:rPr lang="de-DE" sz="1200" dirty="0"/>
-              <a:t> </a:t>
-            </a:r>
-            <a:r>
-              <a:rPr lang="de-DE" sz="1200" dirty="0" err="1"/>
+              <a:rPr lang="de-DE" sz="1200" b="1" dirty="0"/>
+              <a:t> </a:t>
+            </a:r>
+            <a:r>
+              <a:rPr lang="de-DE" sz="1200" b="1" dirty="0" err="1"/>
               <a:t>of</a:t>
             </a:r>
             <a:r>
-              <a:rPr lang="de-DE" sz="1200" dirty="0"/>
-              <a:t> </a:t>
-            </a:r>
-            <a:r>
-              <a:rPr lang="de-DE" sz="1200" dirty="0" err="1"/>
+              <a:rPr lang="de-DE" sz="1200" b="1" dirty="0"/>
+              <a:t> </a:t>
+            </a:r>
+            <a:r>
+              <a:rPr lang="de-DE" sz="1200" b="1" dirty="0" err="1"/>
               <a:t>each</a:t>
             </a:r>
             <a:r>
-              <a:rPr lang="de-DE" sz="1200" dirty="0"/>
-              <a:t> </a:t>
-            </a:r>
-            <a:r>
-              <a:rPr lang="de-DE" sz="1200" dirty="0" err="1"/>
+              <a:rPr lang="de-DE" sz="1200" b="1" dirty="0"/>
+              <a:t> </a:t>
+            </a:r>
+            <a:r>
+              <a:rPr lang="de-DE" sz="1200" b="1" dirty="0" err="1"/>
               <a:t>cue</a:t>
             </a:r>
             <a:r>
-              <a:rPr lang="de-DE" sz="1200" dirty="0"/>
-              <a:t> </a:t>
-            </a:r>
-            <a:r>
-              <a:rPr lang="de-DE" sz="1200" dirty="0" err="1"/>
+              <a:rPr lang="de-DE" sz="1200" b="1" dirty="0"/>
+              <a:t> </a:t>
+            </a:r>
+            <a:r>
+              <a:rPr lang="de-DE" sz="1200" b="1" dirty="0" err="1"/>
               <a:t>with</a:t>
             </a:r>
             <a:r>
-              <a:rPr lang="de-DE" sz="1200" dirty="0"/>
+              <a:rPr lang="de-DE" sz="1200" b="1" dirty="0"/>
               <a:t> HRF</a:t>
             </a:r>
           </a:p>
@@ -6933,24 +6933,28 @@
           </a:p>
           <a:p>
             <a:r>
+              <a:rPr lang="de-DE" sz="1800" b="1" dirty="0"/>
+              <a:t>MVPA </a:t>
+            </a:r>
+            <a:r>
+              <a:rPr lang="de-DE" sz="1800" b="1" dirty="0" err="1"/>
+              <a:t>for</a:t>
+            </a:r>
+            <a:r>
+              <a:rPr lang="de-DE" sz="1800" b="1" dirty="0"/>
+              <a:t> </a:t>
+            </a:r>
+            <a:r>
+              <a:rPr lang="de-DE" sz="1800" b="1" dirty="0" err="1"/>
+              <a:t>reactivation</a:t>
+            </a:r>
+            <a:r>
+              <a:rPr lang="de-DE" sz="1800" b="1" dirty="0"/>
+              <a:t> </a:t>
+            </a:r>
+            <a:r>
               <a:rPr lang="de-DE" sz="1800" dirty="0"/>
-              <a:t>MVPA </a:t>
-            </a:r>
-            <a:r>
-              <a:rPr lang="de-DE" sz="1800" dirty="0" err="1"/>
-              <a:t>for</a:t>
-            </a:r>
-            <a:r>
-              <a:rPr lang="de-DE" sz="1800" dirty="0"/>
-              <a:t> </a:t>
-            </a:r>
-            <a:r>
-              <a:rPr lang="de-DE" sz="1800" dirty="0" err="1"/>
-              <a:t>reactivation</a:t>
-            </a:r>
-            <a:r>
-              <a:rPr lang="de-DE" sz="1800" dirty="0"/>
-              <a:t> = RSA </a:t>
+              <a:t>= RSA </a:t>
             </a:r>
             <a:r>
               <a:rPr lang="de-DE" sz="1800" dirty="0" err="1"/>
@@ -8035,680 +8039,680 @@
           <a:lstStyle/>
           <a:p>
             <a:r>
-              <a:rPr lang="de-DE" sz="1800" dirty="0" err="1"/>
+              <a:rPr lang="de-DE" dirty="0" err="1"/>
               <a:t>Preprocessing</a:t>
             </a:r>
-            <a:endParaRPr lang="de-DE" sz="1800" dirty="0"/>
+            <a:endParaRPr lang="de-DE" dirty="0"/>
           </a:p>
           <a:p>
             <a:pPr lvl="1"/>
             <a:r>
-              <a:rPr lang="de-DE" sz="1400" dirty="0"/>
+              <a:rPr lang="de-DE" sz="2000" dirty="0"/>
               <a:t>Sinc </a:t>
             </a:r>
             <a:r>
-              <a:rPr lang="de-DE" sz="1400" dirty="0" err="1"/>
+              <a:rPr lang="de-DE" sz="2000" dirty="0" err="1"/>
               <a:t>interpolation</a:t>
             </a:r>
             <a:r>
-              <a:rPr lang="de-DE" sz="1400" dirty="0"/>
+              <a:rPr lang="de-DE" sz="2000" dirty="0"/>
               <a:t> and </a:t>
             </a:r>
             <a:r>
-              <a:rPr lang="de-DE" sz="1400" dirty="0" err="1"/>
+              <a:rPr lang="de-DE" sz="2000" dirty="0" err="1"/>
               <a:t>resampling</a:t>
             </a:r>
             <a:r>
-              <a:rPr lang="de-DE" sz="1400" dirty="0"/>
-              <a:t> </a:t>
-            </a:r>
-            <a:r>
-              <a:rPr lang="de-DE" sz="1400" dirty="0" err="1"/>
+              <a:rPr lang="de-DE" sz="2000" dirty="0"/>
+              <a:t> </a:t>
+            </a:r>
+            <a:r>
+              <a:rPr lang="de-DE" sz="2000" dirty="0" err="1"/>
               <a:t>using</a:t>
             </a:r>
             <a:r>
-              <a:rPr lang="de-DE" sz="1400" dirty="0"/>
-              <a:t> </a:t>
-            </a:r>
-            <a:r>
-              <a:rPr lang="de-DE" sz="1400" dirty="0" err="1"/>
+              <a:rPr lang="de-DE" sz="2000" dirty="0"/>
+              <a:t> </a:t>
+            </a:r>
+            <a:r>
+              <a:rPr lang="de-DE" sz="2000" dirty="0" err="1"/>
               <a:t>first</a:t>
             </a:r>
             <a:r>
-              <a:rPr lang="de-DE" sz="1400" dirty="0"/>
+              <a:rPr lang="de-DE" sz="2000" dirty="0"/>
               <a:t> slice </a:t>
             </a:r>
             <a:r>
-              <a:rPr lang="de-DE" sz="1400" dirty="0" err="1"/>
+              <a:rPr lang="de-DE" sz="2000" dirty="0" err="1"/>
               <a:t>as</a:t>
             </a:r>
             <a:r>
-              <a:rPr lang="de-DE" sz="1400" dirty="0"/>
-              <a:t> </a:t>
-            </a:r>
-            <a:r>
-              <a:rPr lang="de-DE" sz="1400" dirty="0" err="1"/>
+              <a:rPr lang="de-DE" sz="2000" dirty="0"/>
+              <a:t> </a:t>
+            </a:r>
+            <a:r>
+              <a:rPr lang="de-DE" sz="2000" dirty="0" err="1"/>
               <a:t>reference</a:t>
             </a:r>
             <a:r>
-              <a:rPr lang="de-DE" sz="1400" dirty="0"/>
-              <a:t> </a:t>
-            </a:r>
-            <a:r>
-              <a:rPr lang="de-DE" sz="1400" dirty="0" err="1"/>
+              <a:rPr lang="de-DE" sz="2000" dirty="0"/>
+              <a:t> </a:t>
+            </a:r>
+            <a:r>
+              <a:rPr lang="de-DE" sz="2000" dirty="0" err="1"/>
               <a:t>point</a:t>
             </a:r>
             <a:r>
-              <a:rPr lang="de-DE" sz="1400" dirty="0"/>
-              <a:t> </a:t>
-            </a:r>
-            <a:r>
-              <a:rPr lang="de-DE" sz="1400" dirty="0" err="1"/>
+              <a:rPr lang="de-DE" sz="2000" dirty="0"/>
+              <a:t> </a:t>
+            </a:r>
+            <a:r>
+              <a:rPr lang="de-DE" sz="2000" dirty="0" err="1"/>
               <a:t>to</a:t>
             </a:r>
             <a:r>
-              <a:rPr lang="de-DE" sz="1400" dirty="0"/>
-              <a:t> </a:t>
-            </a:r>
-            <a:r>
-              <a:rPr lang="de-DE" sz="1400" dirty="0" err="1"/>
+              <a:rPr lang="de-DE" sz="2000" dirty="0"/>
+              <a:t> </a:t>
+            </a:r>
+            <a:r>
+              <a:rPr lang="de-DE" sz="2000" dirty="0" err="1"/>
               <a:t>account</a:t>
             </a:r>
             <a:r>
-              <a:rPr lang="de-DE" sz="1400" dirty="0"/>
-              <a:t> </a:t>
-            </a:r>
-            <a:r>
-              <a:rPr lang="de-DE" sz="1400" dirty="0" err="1"/>
+              <a:rPr lang="de-DE" sz="2000" dirty="0"/>
+              <a:t> </a:t>
+            </a:r>
+            <a:r>
+              <a:rPr lang="de-DE" sz="2000" dirty="0" err="1"/>
               <a:t>for</a:t>
             </a:r>
             <a:r>
-              <a:rPr lang="de-DE" sz="1400" dirty="0"/>
-              <a:t> </a:t>
-            </a:r>
-            <a:r>
-              <a:rPr lang="de-DE" sz="1400" dirty="0" err="1"/>
+              <a:rPr lang="de-DE" sz="2000" dirty="0"/>
+              <a:t> </a:t>
+            </a:r>
+            <a:r>
+              <a:rPr lang="de-DE" sz="2000" dirty="0" err="1"/>
               <a:t>diff</a:t>
             </a:r>
             <a:r>
-              <a:rPr lang="de-DE" sz="1400" dirty="0"/>
+              <a:rPr lang="de-DE" sz="2000" dirty="0"/>
               <a:t> in slice </a:t>
             </a:r>
             <a:r>
-              <a:rPr lang="de-DE" sz="1400" dirty="0" err="1"/>
+              <a:rPr lang="de-DE" sz="2000" dirty="0" err="1"/>
               <a:t>acquisition</a:t>
             </a:r>
             <a:r>
-              <a:rPr lang="de-DE" sz="1400" dirty="0"/>
-              <a:t> </a:t>
-            </a:r>
-            <a:r>
-              <a:rPr lang="de-DE" sz="1400" dirty="0" err="1"/>
+              <a:rPr lang="de-DE" sz="2000" dirty="0"/>
+              <a:t> </a:t>
+            </a:r>
+            <a:r>
+              <a:rPr lang="de-DE" sz="2000" dirty="0" err="1"/>
               <a:t>times</a:t>
             </a:r>
-            <a:endParaRPr lang="de-DE" sz="1400" dirty="0"/>
+            <a:endParaRPr lang="de-DE" sz="2000" dirty="0"/>
           </a:p>
           <a:p>
             <a:pPr lvl="1"/>
             <a:r>
-              <a:rPr lang="de-DE" sz="1400" dirty="0" err="1"/>
+              <a:rPr lang="de-DE" sz="2000" dirty="0" err="1"/>
               <a:t>Realign</a:t>
             </a:r>
             <a:r>
-              <a:rPr lang="de-DE" sz="1400" dirty="0"/>
+              <a:rPr lang="de-DE" sz="2000" dirty="0"/>
               <a:t> slice </a:t>
             </a:r>
             <a:r>
-              <a:rPr lang="de-DE" sz="1400" dirty="0" err="1"/>
+              <a:rPr lang="de-DE" sz="2000" dirty="0" err="1"/>
               <a:t>to</a:t>
             </a:r>
             <a:r>
-              <a:rPr lang="de-DE" sz="1400" dirty="0"/>
-              <a:t> </a:t>
-            </a:r>
-            <a:r>
-              <a:rPr lang="de-DE" sz="1400" dirty="0" err="1"/>
+              <a:rPr lang="de-DE" sz="2000" dirty="0"/>
+              <a:t> </a:t>
+            </a:r>
+            <a:r>
+              <a:rPr lang="de-DE" sz="2000" dirty="0" err="1"/>
               <a:t>forst</a:t>
             </a:r>
             <a:r>
-              <a:rPr lang="de-DE" sz="1400" dirty="0"/>
-              <a:t> </a:t>
-            </a:r>
-            <a:r>
-              <a:rPr lang="de-DE" sz="1400" dirty="0" err="1"/>
+              <a:rPr lang="de-DE" sz="2000" dirty="0"/>
+              <a:t> </a:t>
+            </a:r>
+            <a:r>
+              <a:rPr lang="de-DE" sz="2000" dirty="0" err="1"/>
               <a:t>volume</a:t>
             </a:r>
             <a:r>
-              <a:rPr lang="de-DE" sz="1400" dirty="0"/>
+              <a:rPr lang="de-DE" sz="2000" dirty="0"/>
               <a:t>, and </a:t>
             </a:r>
             <a:r>
-              <a:rPr lang="de-DE" sz="1400" dirty="0" err="1"/>
+              <a:rPr lang="de-DE" sz="2000" dirty="0" err="1"/>
               <a:t>corregistered</a:t>
             </a:r>
             <a:r>
-              <a:rPr lang="de-DE" sz="1400" dirty="0"/>
-              <a:t> </a:t>
-            </a:r>
-            <a:r>
-              <a:rPr lang="de-DE" sz="1400" dirty="0" err="1"/>
+              <a:rPr lang="de-DE" sz="2000" dirty="0"/>
+              <a:t> </a:t>
+            </a:r>
+            <a:r>
+              <a:rPr lang="de-DE" sz="2000" dirty="0" err="1"/>
               <a:t>to</a:t>
             </a:r>
             <a:r>
-              <a:rPr lang="de-DE" sz="1400" dirty="0"/>
+              <a:rPr lang="de-DE" sz="2000" dirty="0"/>
               <a:t> T2 </a:t>
             </a:r>
             <a:r>
-              <a:rPr lang="de-DE" sz="1400" dirty="0" err="1"/>
+              <a:rPr lang="de-DE" sz="2000" dirty="0" err="1"/>
               <a:t>structurql</a:t>
             </a:r>
             <a:r>
-              <a:rPr lang="de-DE" sz="1400" dirty="0"/>
-              <a:t> </a:t>
-            </a:r>
-            <a:r>
-              <a:rPr lang="de-DE" sz="1400" dirty="0" err="1"/>
+              <a:rPr lang="de-DE" sz="2000" dirty="0"/>
+              <a:t> </a:t>
+            </a:r>
+            <a:r>
+              <a:rPr lang="de-DE" sz="2000" dirty="0" err="1"/>
               <a:t>image</a:t>
             </a:r>
-            <a:endParaRPr lang="de-DE" sz="1400" dirty="0"/>
+            <a:endParaRPr lang="de-DE" sz="2000" dirty="0"/>
           </a:p>
           <a:p>
             <a:pPr lvl="1"/>
             <a:r>
-              <a:rPr lang="de-DE" sz="1400" dirty="0"/>
+              <a:rPr lang="de-DE" sz="2000" dirty="0"/>
               <a:t>All in native </a:t>
             </a:r>
             <a:r>
-              <a:rPr lang="de-DE" sz="1400" dirty="0" err="1"/>
+              <a:rPr lang="de-DE" sz="2000" dirty="0" err="1"/>
               <a:t>space</a:t>
             </a:r>
             <a:r>
-              <a:rPr lang="de-DE" sz="1400" dirty="0"/>
+              <a:rPr lang="de-DE" sz="2000" dirty="0"/>
               <a:t>, </a:t>
             </a:r>
             <a:r>
-              <a:rPr lang="de-DE" sz="1400" dirty="0" err="1"/>
+              <a:rPr lang="de-DE" sz="2000" dirty="0" err="1"/>
               <a:t>no</a:t>
             </a:r>
             <a:r>
-              <a:rPr lang="de-DE" sz="1400" dirty="0"/>
-              <a:t> </a:t>
-            </a:r>
-            <a:r>
-              <a:rPr lang="de-DE" sz="1400" dirty="0" err="1"/>
+              <a:rPr lang="de-DE" sz="2000" dirty="0"/>
+              <a:t> </a:t>
+            </a:r>
+            <a:r>
+              <a:rPr lang="de-DE" sz="2000" dirty="0" err="1"/>
               <a:t>smoothing</a:t>
             </a:r>
-            <a:endParaRPr lang="de-DE" sz="1400" dirty="0"/>
-          </a:p>
-          <a:p>
-            <a:r>
-              <a:rPr lang="de-DE" sz="1800" dirty="0"/>
+            <a:endParaRPr lang="de-DE" sz="2000" dirty="0"/>
+          </a:p>
+          <a:p>
+            <a:r>
+              <a:rPr lang="de-DE" dirty="0"/>
               <a:t>MVPA </a:t>
             </a:r>
             <a:r>
-              <a:rPr lang="de-DE" sz="1800" dirty="0" err="1"/>
+              <a:rPr lang="de-DE" dirty="0" err="1"/>
               <a:t>classification</a:t>
             </a:r>
-            <a:endParaRPr lang="de-DE" sz="1800" dirty="0"/>
+            <a:endParaRPr lang="de-DE" dirty="0"/>
           </a:p>
           <a:p>
             <a:pPr lvl="1"/>
             <a:r>
-              <a:rPr lang="de-DE" sz="1400" dirty="0"/>
+              <a:rPr lang="de-DE" sz="2000" dirty="0"/>
               <a:t>Princeton </a:t>
             </a:r>
             <a:r>
-              <a:rPr lang="de-DE" sz="1400" dirty="0" err="1"/>
+              <a:rPr lang="de-DE" sz="2000" dirty="0" err="1"/>
               <a:t>mvpa</a:t>
             </a:r>
             <a:r>
-              <a:rPr lang="de-DE" sz="1400" dirty="0"/>
-              <a:t> </a:t>
-            </a:r>
-            <a:r>
-              <a:rPr lang="de-DE" sz="1400" dirty="0" err="1"/>
+              <a:rPr lang="de-DE" sz="2000" dirty="0"/>
+              <a:t> </a:t>
+            </a:r>
+            <a:r>
+              <a:rPr lang="de-DE" sz="2000" dirty="0" err="1"/>
               <a:t>toolbox</a:t>
             </a:r>
             <a:r>
-              <a:rPr lang="de-DE" sz="1400" dirty="0"/>
+              <a:rPr lang="de-DE" sz="2000" dirty="0"/>
               <a:t>, </a:t>
             </a:r>
             <a:r>
-              <a:rPr lang="de-DE" sz="1400" dirty="0" err="1"/>
+              <a:rPr lang="de-DE" sz="2000" dirty="0" err="1"/>
               <a:t>trained</a:t>
             </a:r>
             <a:r>
-              <a:rPr lang="de-DE" sz="1400" dirty="0"/>
+              <a:rPr lang="de-DE" sz="2000" dirty="0"/>
               <a:t> on </a:t>
             </a:r>
             <a:r>
-              <a:rPr lang="de-DE" sz="1400" dirty="0" err="1"/>
+              <a:rPr lang="de-DE" sz="2000" dirty="0" err="1"/>
               <a:t>localizer</a:t>
             </a:r>
-            <a:endParaRPr lang="de-DE" sz="1400" dirty="0"/>
+            <a:endParaRPr lang="de-DE" sz="2000" dirty="0"/>
           </a:p>
           <a:p>
             <a:pPr lvl="1"/>
             <a:r>
-              <a:rPr lang="de-DE" sz="1400" dirty="0"/>
+              <a:rPr lang="de-DE" sz="2000" dirty="0"/>
               <a:t>Ventral temporal lobe </a:t>
             </a:r>
             <a:r>
-              <a:rPr lang="de-DE" sz="1400" dirty="0" err="1"/>
+              <a:rPr lang="de-DE" sz="2000" dirty="0" err="1"/>
               <a:t>mask</a:t>
             </a:r>
             <a:r>
-              <a:rPr lang="de-DE" sz="1400" dirty="0"/>
+              <a:rPr lang="de-DE" sz="2000" dirty="0"/>
               <a:t> (</a:t>
             </a:r>
             <a:r>
-              <a:rPr lang="de-DE" sz="1400" dirty="0" err="1"/>
+              <a:rPr lang="de-DE" sz="2000" dirty="0" err="1"/>
               <a:t>visually</a:t>
             </a:r>
             <a:r>
-              <a:rPr lang="de-DE" sz="1400" dirty="0"/>
-              <a:t> </a:t>
-            </a:r>
-            <a:r>
-              <a:rPr lang="de-DE" sz="1400" dirty="0" err="1"/>
+              <a:rPr lang="de-DE" sz="2000" dirty="0"/>
+              <a:t> </a:t>
+            </a:r>
+            <a:r>
+              <a:rPr lang="de-DE" sz="2000" dirty="0" err="1"/>
               <a:t>selective</a:t>
             </a:r>
             <a:r>
-              <a:rPr lang="de-DE" sz="1400" dirty="0"/>
-              <a:t> </a:t>
-            </a:r>
-            <a:r>
-              <a:rPr lang="de-DE" sz="1400" dirty="0" err="1"/>
+              <a:rPr lang="de-DE" sz="2000" dirty="0"/>
+              <a:t> </a:t>
+            </a:r>
+            <a:r>
+              <a:rPr lang="de-DE" sz="2000" dirty="0" err="1"/>
               <a:t>areas</a:t>
             </a:r>
             <a:r>
-              <a:rPr lang="de-DE" sz="1400" dirty="0"/>
+              <a:rPr lang="de-DE" sz="2000" dirty="0"/>
               <a:t>) = </a:t>
             </a:r>
             <a:r>
-              <a:rPr lang="de-DE" sz="1400" dirty="0" err="1"/>
+              <a:rPr lang="de-DE" sz="2000" dirty="0" err="1"/>
               <a:t>inferotemporal</a:t>
             </a:r>
             <a:r>
-              <a:rPr lang="de-DE" sz="1400" dirty="0"/>
-              <a:t> </a:t>
-            </a:r>
-            <a:r>
-              <a:rPr lang="de-DE" sz="1400" dirty="0" err="1"/>
+              <a:rPr lang="de-DE" sz="2000" dirty="0"/>
+              <a:t> </a:t>
+            </a:r>
+            <a:r>
+              <a:rPr lang="de-DE" sz="2000" dirty="0" err="1"/>
               <a:t>cortex</a:t>
             </a:r>
             <a:r>
-              <a:rPr lang="de-DE" sz="1400" dirty="0"/>
+              <a:rPr lang="de-DE" sz="2000" dirty="0"/>
               <a:t>, fusiform </a:t>
             </a:r>
             <a:r>
-              <a:rPr lang="de-DE" sz="1400" dirty="0" err="1"/>
+              <a:rPr lang="de-DE" sz="2000" dirty="0" err="1"/>
               <a:t>gyrus</a:t>
             </a:r>
             <a:r>
-              <a:rPr lang="de-DE" sz="1400" dirty="0"/>
+              <a:rPr lang="de-DE" sz="2000" dirty="0"/>
               <a:t> and </a:t>
             </a:r>
             <a:r>
-              <a:rPr lang="de-DE" sz="1400" dirty="0" err="1"/>
+              <a:rPr lang="de-DE" sz="2000" dirty="0" err="1"/>
               <a:t>parahippo</a:t>
             </a:r>
             <a:r>
-              <a:rPr lang="de-DE" sz="1400" dirty="0"/>
-              <a:t> </a:t>
-            </a:r>
-            <a:r>
-              <a:rPr lang="de-DE" sz="1400" dirty="0" err="1"/>
+              <a:rPr lang="de-DE" sz="2000" dirty="0"/>
+              <a:t> </a:t>
+            </a:r>
+            <a:r>
+              <a:rPr lang="de-DE" sz="2000" dirty="0" err="1"/>
               <a:t>gyrus</a:t>
             </a:r>
             <a:r>
-              <a:rPr lang="de-DE" sz="1400" dirty="0"/>
+              <a:rPr lang="de-DE" sz="2000" dirty="0"/>
               <a:t>, </a:t>
             </a:r>
             <a:r>
-              <a:rPr lang="de-DE" sz="1400" dirty="0" err="1"/>
+              <a:rPr lang="de-DE" sz="2000" dirty="0" err="1"/>
               <a:t>from</a:t>
             </a:r>
             <a:r>
-              <a:rPr lang="de-DE" sz="1400" dirty="0"/>
-              <a:t> </a:t>
-            </a:r>
-            <a:r>
-              <a:rPr lang="de-DE" sz="1400" dirty="0" err="1"/>
+              <a:rPr lang="de-DE" sz="2000" dirty="0"/>
+              <a:t> </a:t>
+            </a:r>
+            <a:r>
+              <a:rPr lang="de-DE" sz="2000" dirty="0" err="1"/>
               <a:t>freesurfer</a:t>
             </a:r>
             <a:r>
-              <a:rPr lang="de-DE" sz="1400" dirty="0"/>
-              <a:t> </a:t>
-            </a:r>
-            <a:r>
-              <a:rPr lang="de-DE" sz="1400" dirty="0" err="1"/>
+              <a:rPr lang="de-DE" sz="2000" dirty="0"/>
+              <a:t> </a:t>
+            </a:r>
+            <a:r>
+              <a:rPr lang="de-DE" sz="2000" dirty="0" err="1"/>
               <a:t>parcellation</a:t>
             </a:r>
-            <a:endParaRPr lang="de-DE" sz="1400" dirty="0"/>
+            <a:endParaRPr lang="de-DE" sz="2000" dirty="0"/>
           </a:p>
           <a:p>
             <a:pPr lvl="1"/>
             <a:r>
-              <a:rPr lang="de-DE" sz="1400" dirty="0"/>
+              <a:rPr lang="de-DE" sz="2000" dirty="0"/>
               <a:t>Regressor </a:t>
             </a:r>
             <a:r>
-              <a:rPr lang="de-DE" sz="1400" dirty="0" err="1"/>
+              <a:rPr lang="de-DE" sz="2000" dirty="0" err="1"/>
               <a:t>matrix</a:t>
             </a:r>
             <a:r>
-              <a:rPr lang="de-DE" sz="1400" dirty="0"/>
+              <a:rPr lang="de-DE" sz="2000" dirty="0"/>
               <a:t> = </a:t>
             </a:r>
             <a:r>
-              <a:rPr lang="de-DE" sz="1400" dirty="0" err="1"/>
+              <a:rPr lang="de-DE" sz="2000" dirty="0" err="1"/>
               <a:t>repetition</a:t>
             </a:r>
             <a:r>
-              <a:rPr lang="de-DE" sz="1400" dirty="0"/>
-              <a:t> </a:t>
-            </a:r>
-            <a:r>
-              <a:rPr lang="de-DE" sz="1400" dirty="0" err="1"/>
+              <a:rPr lang="de-DE" sz="2000" dirty="0"/>
+              <a:t> </a:t>
+            </a:r>
+            <a:r>
+              <a:rPr lang="de-DE" sz="2000" dirty="0" err="1"/>
               <a:t>nb</a:t>
             </a:r>
             <a:r>
-              <a:rPr lang="de-DE" sz="1400" dirty="0"/>
+              <a:rPr lang="de-DE" sz="2000" dirty="0"/>
               <a:t> (1-3), </a:t>
             </a:r>
             <a:r>
-              <a:rPr lang="de-DE" sz="1400" dirty="0" err="1"/>
+              <a:rPr lang="de-DE" sz="2000" dirty="0" err="1"/>
               <a:t>triad</a:t>
             </a:r>
             <a:r>
-              <a:rPr lang="de-DE" sz="1400" dirty="0"/>
+              <a:rPr lang="de-DE" sz="2000" dirty="0"/>
               <a:t> type (OOO, OOS), on 36 time </a:t>
             </a:r>
             <a:r>
-              <a:rPr lang="de-DE" sz="1400" dirty="0" err="1"/>
+              <a:rPr lang="de-DE" sz="2000" dirty="0" err="1"/>
               <a:t>points</a:t>
             </a:r>
             <a:r>
-              <a:rPr lang="de-DE" sz="1400" dirty="0"/>
+              <a:rPr lang="de-DE" sz="2000" dirty="0"/>
               <a:t> (w a 6s shift </a:t>
             </a:r>
             <a:r>
-              <a:rPr lang="de-DE" sz="1400" dirty="0" err="1"/>
+              <a:rPr lang="de-DE" sz="2000" dirty="0" err="1"/>
               <a:t>to</a:t>
             </a:r>
             <a:r>
-              <a:rPr lang="de-DE" sz="1400" dirty="0"/>
-              <a:t> </a:t>
-            </a:r>
-            <a:r>
-              <a:rPr lang="de-DE" sz="1400" dirty="0" err="1"/>
+              <a:rPr lang="de-DE" sz="2000" dirty="0"/>
+              <a:t> </a:t>
+            </a:r>
+            <a:r>
+              <a:rPr lang="de-DE" sz="2000" dirty="0" err="1"/>
               <a:t>account</a:t>
             </a:r>
             <a:r>
-              <a:rPr lang="de-DE" sz="1400" dirty="0"/>
-              <a:t> </a:t>
-            </a:r>
-            <a:r>
-              <a:rPr lang="de-DE" sz="1400" dirty="0" err="1"/>
+              <a:rPr lang="de-DE" sz="2000" dirty="0"/>
+              <a:t> </a:t>
+            </a:r>
+            <a:r>
+              <a:rPr lang="de-DE" sz="2000" dirty="0" err="1"/>
               <a:t>for</a:t>
             </a:r>
             <a:r>
-              <a:rPr lang="de-DE" sz="1400" dirty="0"/>
-              <a:t> </a:t>
-            </a:r>
-            <a:r>
-              <a:rPr lang="de-DE" sz="1400" dirty="0" err="1"/>
+              <a:rPr lang="de-DE" sz="2000" dirty="0"/>
+              <a:t> </a:t>
+            </a:r>
+            <a:r>
+              <a:rPr lang="de-DE" sz="2000" dirty="0" err="1"/>
               <a:t>hemodynamic</a:t>
             </a:r>
             <a:r>
-              <a:rPr lang="de-DE" sz="1400" dirty="0"/>
+              <a:rPr lang="de-DE" sz="2000" dirty="0"/>
               <a:t> lag)</a:t>
             </a:r>
           </a:p>
           <a:p>
             <a:pPr lvl="1"/>
             <a:r>
-              <a:rPr lang="de-DE" sz="1400" dirty="0"/>
+              <a:rPr lang="de-DE" sz="2000" dirty="0"/>
               <a:t>Average </a:t>
             </a:r>
             <a:r>
-              <a:rPr lang="de-DE" sz="1400" dirty="0" err="1"/>
+              <a:rPr lang="de-DE" sz="2000" dirty="0" err="1"/>
               <a:t>classifier</a:t>
             </a:r>
             <a:r>
-              <a:rPr lang="de-DE" sz="1400" dirty="0"/>
-              <a:t> </a:t>
-            </a:r>
-            <a:r>
-              <a:rPr lang="de-DE" sz="1400" dirty="0" err="1"/>
+              <a:rPr lang="de-DE" sz="2000" dirty="0"/>
+              <a:t> </a:t>
+            </a:r>
+            <a:r>
+              <a:rPr lang="de-DE" sz="2000" dirty="0" err="1"/>
               <a:t>output</a:t>
             </a:r>
             <a:r>
-              <a:rPr lang="de-DE" sz="1400" dirty="0"/>
-              <a:t> </a:t>
-            </a:r>
-            <a:r>
-              <a:rPr lang="de-DE" sz="1400" dirty="0" err="1"/>
+              <a:rPr lang="de-DE" sz="2000" dirty="0"/>
+              <a:t> </a:t>
+            </a:r>
+            <a:r>
+              <a:rPr lang="de-DE" sz="2000" dirty="0" err="1"/>
               <a:t>by</a:t>
             </a:r>
             <a:r>
-              <a:rPr lang="de-DE" sz="1400" dirty="0"/>
-              <a:t> </a:t>
-            </a:r>
-            <a:r>
-              <a:rPr lang="de-DE" sz="1400" dirty="0" err="1"/>
+              <a:rPr lang="de-DE" sz="2000" dirty="0"/>
+              <a:t> </a:t>
+            </a:r>
+            <a:r>
+              <a:rPr lang="de-DE" sz="2000" dirty="0" err="1"/>
               <a:t>condition</a:t>
             </a:r>
-            <a:endParaRPr lang="de-DE" sz="1400" dirty="0"/>
+            <a:endParaRPr lang="de-DE" sz="2000" dirty="0"/>
           </a:p>
           <a:p>
             <a:pPr lvl="1"/>
             <a:r>
-              <a:rPr lang="de-DE" sz="1400" b="1" dirty="0" err="1"/>
+              <a:rPr lang="de-DE" sz="2000" b="1" dirty="0" err="1"/>
               <a:t>Reactivation</a:t>
             </a:r>
             <a:r>
-              <a:rPr lang="de-DE" sz="1400" b="1" dirty="0"/>
+              <a:rPr lang="de-DE" sz="2000" b="1" dirty="0"/>
               <a:t> = </a:t>
             </a:r>
             <a:r>
-              <a:rPr lang="de-DE" sz="1400" b="1" dirty="0" err="1"/>
+              <a:rPr lang="de-DE" sz="2000" b="1" dirty="0" err="1"/>
               <a:t>output</a:t>
             </a:r>
             <a:r>
-              <a:rPr lang="de-DE" sz="1400" b="1" dirty="0"/>
+              <a:rPr lang="de-DE" sz="2000" b="1" dirty="0"/>
               <a:t> OOS – </a:t>
             </a:r>
             <a:r>
-              <a:rPr lang="de-DE" sz="1400" b="1" dirty="0" err="1"/>
+              <a:rPr lang="de-DE" sz="2000" b="1" dirty="0" err="1"/>
               <a:t>output</a:t>
             </a:r>
             <a:r>
-              <a:rPr lang="de-DE" sz="1400" b="1" dirty="0"/>
-              <a:t> OOS</a:t>
-            </a:r>
-          </a:p>
-          <a:p>
-            <a:r>
-              <a:rPr lang="de-DE" sz="1800" dirty="0"/>
+              <a:rPr lang="de-DE" sz="2000" b="1" dirty="0"/>
+              <a:t> OOO</a:t>
+            </a:r>
+          </a:p>
+          <a:p>
+            <a:r>
+              <a:rPr lang="de-DE" dirty="0"/>
               <a:t>ROI </a:t>
             </a:r>
             <a:r>
-              <a:rPr lang="de-DE" sz="1800" dirty="0" err="1"/>
+              <a:rPr lang="de-DE" dirty="0" err="1"/>
               <a:t>activation</a:t>
             </a:r>
             <a:r>
-              <a:rPr lang="de-DE" sz="1800" dirty="0"/>
-              <a:t> </a:t>
-            </a:r>
-            <a:r>
-              <a:rPr lang="de-DE" sz="1800" dirty="0" err="1"/>
+              <a:rPr lang="de-DE" dirty="0"/>
+              <a:t> </a:t>
+            </a:r>
+            <a:r>
+              <a:rPr lang="de-DE" dirty="0" err="1"/>
               <a:t>change</a:t>
             </a:r>
             <a:r>
-              <a:rPr lang="de-DE" sz="1800" dirty="0"/>
-              <a:t> </a:t>
-            </a:r>
-            <a:r>
-              <a:rPr lang="de-DE" sz="1800" dirty="0" err="1"/>
+              <a:rPr lang="de-DE" dirty="0"/>
+              <a:t> </a:t>
+            </a:r>
+            <a:r>
+              <a:rPr lang="de-DE" dirty="0" err="1"/>
               <a:t>correl</a:t>
             </a:r>
             <a:r>
-              <a:rPr lang="de-DE" sz="1800" dirty="0"/>
+              <a:rPr lang="de-DE" dirty="0"/>
               <a:t> w/ </a:t>
             </a:r>
             <a:r>
-              <a:rPr lang="de-DE" sz="1800" dirty="0" err="1"/>
+              <a:rPr lang="de-DE" dirty="0" err="1"/>
               <a:t>reactivation</a:t>
             </a:r>
             <a:r>
-              <a:rPr lang="de-DE" sz="1800" dirty="0"/>
-              <a:t> </a:t>
-            </a:r>
-            <a:r>
-              <a:rPr lang="de-DE" sz="1800" dirty="0" err="1"/>
+              <a:rPr lang="de-DE" dirty="0"/>
+              <a:t> </a:t>
+            </a:r>
+            <a:r>
+              <a:rPr lang="de-DE" dirty="0" err="1"/>
               <a:t>index</a:t>
             </a:r>
             <a:r>
-              <a:rPr lang="de-DE" sz="1800" dirty="0"/>
+              <a:rPr lang="de-DE" dirty="0"/>
               <a:t> and AC </a:t>
             </a:r>
             <a:r>
-              <a:rPr lang="de-DE" sz="1800" dirty="0" err="1"/>
+              <a:rPr lang="de-DE" dirty="0" err="1"/>
               <a:t>perf</a:t>
             </a:r>
             <a:r>
-              <a:rPr lang="de-DE" sz="1800" dirty="0"/>
+              <a:rPr lang="de-DE" dirty="0"/>
               <a:t> </a:t>
             </a:r>
           </a:p>
           <a:p>
             <a:pPr lvl="1"/>
             <a:r>
-              <a:rPr lang="de-DE" sz="1400" dirty="0" err="1"/>
+              <a:rPr lang="de-DE" sz="2000" dirty="0" err="1"/>
               <a:t>analysis</a:t>
             </a:r>
             <a:r>
-              <a:rPr lang="de-DE" sz="1400" dirty="0"/>
+              <a:rPr lang="de-DE" sz="2000" dirty="0"/>
               <a:t> (MTL and VMPFC) </a:t>
             </a:r>
             <a:r>
-              <a:rPr lang="de-DE" sz="1400" dirty="0" err="1"/>
+              <a:rPr lang="de-DE" sz="2000" dirty="0" err="1"/>
               <a:t>corr</a:t>
             </a:r>
             <a:r>
-              <a:rPr lang="de-DE" sz="1400" dirty="0"/>
+              <a:rPr lang="de-DE" sz="2000" dirty="0"/>
               <a:t> + </a:t>
             </a:r>
             <a:r>
-              <a:rPr lang="de-DE" sz="1400" dirty="0" err="1"/>
+              <a:rPr lang="de-DE" sz="2000" dirty="0" err="1"/>
               <a:t>other</a:t>
             </a:r>
             <a:r>
-              <a:rPr lang="de-DE" sz="1400" dirty="0"/>
+              <a:rPr lang="de-DE" sz="2000" dirty="0"/>
               <a:t> ROIs </a:t>
             </a:r>
             <a:r>
-              <a:rPr lang="de-DE" sz="1400" dirty="0" err="1"/>
+              <a:rPr lang="de-DE" sz="2000" dirty="0" err="1"/>
               <a:t>as</a:t>
             </a:r>
             <a:r>
-              <a:rPr lang="de-DE" sz="1400" dirty="0"/>
-              <a:t> </a:t>
-            </a:r>
-            <a:r>
-              <a:rPr lang="de-DE" sz="1400" dirty="0" err="1"/>
+              <a:rPr lang="de-DE" sz="2000" dirty="0"/>
+              <a:t> </a:t>
+            </a:r>
+            <a:r>
+              <a:rPr lang="de-DE" sz="2000" dirty="0" err="1"/>
               <a:t>control</a:t>
             </a:r>
-            <a:endParaRPr lang="de-DE" sz="1400" dirty="0"/>
-          </a:p>
-          <a:p>
-            <a:r>
-              <a:rPr lang="de-DE" sz="1800" dirty="0" err="1"/>
+            <a:endParaRPr lang="de-DE" sz="2000" dirty="0"/>
+          </a:p>
+          <a:p>
+            <a:r>
+              <a:rPr lang="de-DE" b="1" dirty="0" err="1"/>
               <a:t>Functional</a:t>
             </a:r>
             <a:r>
-              <a:rPr lang="de-DE" sz="1800" dirty="0"/>
-              <a:t> </a:t>
-            </a:r>
-            <a:r>
-              <a:rPr lang="de-DE" sz="1800" dirty="0" err="1"/>
+              <a:rPr lang="de-DE" b="1" dirty="0"/>
+              <a:t> </a:t>
+            </a:r>
+            <a:r>
+              <a:rPr lang="de-DE" b="1" dirty="0" err="1"/>
               <a:t>connectivity</a:t>
             </a:r>
             <a:r>
-              <a:rPr lang="de-DE" sz="1800" dirty="0"/>
+              <a:rPr lang="de-DE" b="1" dirty="0"/>
               <a:t> w/ </a:t>
             </a:r>
             <a:r>
-              <a:rPr lang="de-DE" sz="1800" dirty="0" err="1"/>
+              <a:rPr lang="de-DE" b="1" dirty="0" err="1"/>
               <a:t>hippo</a:t>
             </a:r>
             <a:r>
-              <a:rPr lang="de-DE" sz="1800" dirty="0"/>
-              <a:t> </a:t>
-            </a:r>
-            <a:r>
-              <a:rPr lang="de-DE" sz="1800" dirty="0" err="1"/>
+              <a:rPr lang="de-DE" b="1" dirty="0"/>
+              <a:t> </a:t>
+            </a:r>
+            <a:r>
+              <a:rPr lang="de-DE" b="1" dirty="0" err="1"/>
               <a:t>as</a:t>
             </a:r>
             <a:r>
-              <a:rPr lang="de-DE" sz="1800" dirty="0"/>
-              <a:t> </a:t>
-            </a:r>
-            <a:r>
-              <a:rPr lang="de-DE" sz="1800" dirty="0" err="1"/>
+              <a:rPr lang="de-DE" b="1" dirty="0"/>
+              <a:t> </a:t>
+            </a:r>
+            <a:r>
+              <a:rPr lang="de-DE" b="1" dirty="0" err="1"/>
               <a:t>seed</a:t>
             </a:r>
-            <a:endParaRPr lang="de-DE" sz="1800" dirty="0"/>
+            <a:endParaRPr lang="de-DE" b="1" dirty="0"/>
           </a:p>
           <a:p>
             <a:pPr lvl="1"/>
             <a:r>
-              <a:rPr lang="de-DE" sz="1400" dirty="0"/>
+              <a:rPr lang="de-DE" sz="2000" dirty="0"/>
               <a:t>By </a:t>
             </a:r>
             <a:r>
-              <a:rPr lang="de-DE" sz="1400" dirty="0" err="1"/>
+              <a:rPr lang="de-DE" sz="2000" dirty="0" err="1"/>
               <a:t>run</a:t>
             </a:r>
             <a:r>
-              <a:rPr lang="de-DE" sz="1400" dirty="0"/>
+              <a:rPr lang="de-DE" sz="2000" dirty="0"/>
               <a:t>/</a:t>
             </a:r>
             <a:r>
-              <a:rPr lang="de-DE" sz="1400" dirty="0" err="1"/>
+              <a:rPr lang="de-DE" sz="2000" dirty="0" err="1"/>
               <a:t>repetition</a:t>
             </a:r>
-            <a:endParaRPr lang="de-DE" sz="1400" dirty="0"/>
+            <a:endParaRPr lang="de-DE" sz="2000" dirty="0"/>
           </a:p>
           <a:p>
             <a:pPr lvl="1"/>
             <a:r>
-              <a:rPr lang="de-DE" sz="1400" dirty="0" err="1"/>
+              <a:rPr lang="de-DE" sz="2000" dirty="0" err="1"/>
               <a:t>Repeated</a:t>
             </a:r>
             <a:r>
-              <a:rPr lang="de-DE" sz="1400" dirty="0"/>
-              <a:t> </a:t>
-            </a:r>
-            <a:r>
-              <a:rPr lang="de-DE" sz="1400" dirty="0" err="1"/>
+              <a:rPr lang="de-DE" sz="2000" dirty="0"/>
+              <a:t> </a:t>
+            </a:r>
+            <a:r>
+              <a:rPr lang="de-DE" sz="2000" dirty="0" err="1"/>
               <a:t>measure</a:t>
             </a:r>
             <a:r>
-              <a:rPr lang="de-DE" sz="1400" dirty="0"/>
+              <a:rPr lang="de-DE" sz="2000" dirty="0"/>
               <a:t> ANOVA on </a:t>
             </a:r>
             <a:r>
-              <a:rPr lang="de-DE" sz="1400" dirty="0" err="1"/>
+              <a:rPr lang="de-DE" sz="2000" dirty="0" err="1"/>
               <a:t>result</a:t>
             </a:r>
-            <a:endParaRPr lang="de-DE" sz="1400" dirty="0"/>
+            <a:endParaRPr lang="de-DE" sz="2000" dirty="0"/>
           </a:p>
           <a:p>
             <a:pPr lvl="1"/>
-            <a:endParaRPr lang="de-DE" sz="1400" dirty="0"/>
+            <a:endParaRPr lang="de-DE" sz="2000" dirty="0"/>
           </a:p>
         </p:txBody>
       </p:sp>
@@ -8997,14 +9001,14 @@
           </a:p>
           <a:p>
             <a:r>
-              <a:rPr lang="de-DE" sz="1800" dirty="0"/>
+              <a:rPr lang="de-DE" sz="1800" b="1" dirty="0"/>
               <a:t>Univariate </a:t>
             </a:r>
             <a:r>
-              <a:rPr lang="de-DE" sz="1800" dirty="0" err="1"/>
+              <a:rPr lang="de-DE" sz="1800" b="1" dirty="0" err="1"/>
               <a:t>analysis</a:t>
             </a:r>
-            <a:endParaRPr lang="de-DE" sz="1800" dirty="0"/>
+            <a:endParaRPr lang="de-DE" sz="1800" b="1" dirty="0"/>
           </a:p>
           <a:p>
             <a:pPr lvl="1"/>
@@ -9230,22 +9234,22 @@
           </a:p>
           <a:p>
             <a:r>
-              <a:rPr lang="de-DE" sz="1800" dirty="0"/>
+              <a:rPr lang="de-DE" sz="1800" b="1" dirty="0"/>
               <a:t>Group </a:t>
             </a:r>
             <a:r>
-              <a:rPr lang="de-DE" sz="1800" dirty="0" err="1"/>
+              <a:rPr lang="de-DE" sz="1800" b="1" dirty="0" err="1"/>
               <a:t>level</a:t>
             </a:r>
             <a:r>
-              <a:rPr lang="de-DE" sz="1800" dirty="0"/>
+              <a:rPr lang="de-DE" sz="1800" b="1" dirty="0"/>
               <a:t> univariate </a:t>
             </a:r>
             <a:r>
-              <a:rPr lang="de-DE" sz="1800" dirty="0" err="1"/>
+              <a:rPr lang="de-DE" sz="1800" b="1" dirty="0" err="1"/>
               <a:t>analysis</a:t>
             </a:r>
-            <a:endParaRPr lang="de-DE" sz="1800" dirty="0"/>
+            <a:endParaRPr lang="de-DE" sz="1800" b="1" dirty="0"/>
           </a:p>
           <a:p>
             <a:pPr lvl="1"/>
@@ -9460,7 +9464,7 @@
           </a:p>
           <a:p>
             <a:r>
-              <a:rPr lang="de-DE" sz="1800" dirty="0"/>
+              <a:rPr lang="de-DE" sz="1800" b="1" dirty="0"/>
               <a:t>MVPA RSA</a:t>
             </a:r>
           </a:p>
@@ -10212,7 +10216,7 @@
               <a:t>test</a:t>
             </a:r>
             <a:r>
-              <a:rPr lang="de-DE" sz="1100"/>
+              <a:rPr lang="de-DE" sz="1100" dirty="0"/>
               <a:t>;  </a:t>
             </a:r>
             <a:r>

</xml_diff>